<commit_message>
Database is added. Database Code is added in PowerPoint.
</commit_message>
<xml_diff>
--- a/Documents/Database_ER_Diagram.pptx
+++ b/Documents/Database_ER_Diagram.pptx
@@ -7,6 +7,7 @@
   <p:sldIdLst>
     <p:sldId id="256" r:id="rId2"/>
     <p:sldId id="257" r:id="rId3"/>
+    <p:sldId id="258" r:id="rId4"/>
   </p:sldIdLst>
   <p:sldSz cx="9144000" cy="6858000" type="screen4x3"/>
   <p:notesSz cx="6858000" cy="9144000"/>
@@ -5639,6 +5640,264 @@
     <p:extLst>
       <p:ext uri="{BB962C8B-B14F-4D97-AF65-F5344CB8AC3E}">
         <p14:creationId xmlns:p14="http://schemas.microsoft.com/office/powerpoint/2010/main" val="3170856331"/>
+      </p:ext>
+    </p:extLst>
+  </p:cSld>
+  <p:clrMapOvr>
+    <a:masterClrMapping/>
+  </p:clrMapOvr>
+</p:sld>
+</file>
+
+<file path=ppt/slides/slide3.xml><?xml version="1.0" encoding="utf-8"?>
+<p:sld xmlns:a="http://schemas.openxmlformats.org/drawingml/2006/main" xmlns:r="http://schemas.openxmlformats.org/officeDocument/2006/relationships" xmlns:p="http://schemas.openxmlformats.org/presentationml/2006/main">
+  <p:cSld>
+    <p:spTree>
+      <p:nvGrpSpPr>
+        <p:cNvPr id="1" name=""/>
+        <p:cNvGrpSpPr/>
+        <p:nvPr/>
+      </p:nvGrpSpPr>
+      <p:grpSpPr>
+        <a:xfrm>
+          <a:off x="0" y="0"/>
+          <a:ext cx="0" cy="0"/>
+          <a:chOff x="0" y="0"/>
+          <a:chExt cx="0" cy="0"/>
+        </a:xfrm>
+      </p:grpSpPr>
+      <p:sp>
+        <p:nvSpPr>
+          <p:cNvPr id="4" name="TextBox 3"/>
+          <p:cNvSpPr txBox="1"/>
+          <p:nvPr/>
+        </p:nvSpPr>
+        <p:spPr>
+          <a:xfrm>
+            <a:off x="611560" y="2276872"/>
+            <a:ext cx="7704856" cy="1200329"/>
+          </a:xfrm>
+          <a:prstGeom prst="rect">
+            <a:avLst/>
+          </a:prstGeom>
+          <a:noFill/>
+        </p:spPr>
+        <p:txBody>
+          <a:bodyPr wrap="square" rtlCol="0">
+            <a:spAutoFit/>
+          </a:bodyPr>
+          <a:lstStyle/>
+          <a:p>
+            <a:r>
+              <a:rPr lang="en-US" dirty="0" smtClean="0"/>
+              <a:t>CREATE TABLE Task(TID INTEGER NOT NULL PRIMARY KEY AUTOINCREMENT, PID INT NOT NULL, </a:t>
+            </a:r>
+            <a:r>
+              <a:rPr lang="en-US" dirty="0" err="1" smtClean="0"/>
+              <a:t>TaskName</a:t>
+            </a:r>
+            <a:r>
+              <a:rPr lang="en-US" dirty="0" smtClean="0"/>
+              <a:t> VARCHAR(50) NOT NULL, </a:t>
+            </a:r>
+            <a:r>
+              <a:rPr lang="en-US" dirty="0" err="1" smtClean="0"/>
+              <a:t>StartDate</a:t>
+            </a:r>
+            <a:r>
+              <a:rPr lang="en-US" dirty="0" smtClean="0"/>
+              <a:t> DATE, </a:t>
+            </a:r>
+            <a:r>
+              <a:rPr lang="en-US" dirty="0" err="1" smtClean="0"/>
+              <a:t>DeadLine</a:t>
+            </a:r>
+            <a:r>
+              <a:rPr lang="en-US" dirty="0" smtClean="0"/>
+              <a:t> Date, Budget INT, Done BOOLEAN, FOREIGN KEY (PID) REFRENCES Project(PID) ON DELETE CASCADE);</a:t>
+            </a:r>
+            <a:endParaRPr lang="en-US" dirty="0"/>
+          </a:p>
+        </p:txBody>
+      </p:sp>
+      <p:sp>
+        <p:nvSpPr>
+          <p:cNvPr id="5" name="TextBox 4"/>
+          <p:cNvSpPr txBox="1"/>
+          <p:nvPr/>
+        </p:nvSpPr>
+        <p:spPr>
+          <a:xfrm>
+            <a:off x="757282" y="692696"/>
+            <a:ext cx="7704856" cy="923330"/>
+          </a:xfrm>
+          <a:prstGeom prst="rect">
+            <a:avLst/>
+          </a:prstGeom>
+          <a:noFill/>
+        </p:spPr>
+        <p:txBody>
+          <a:bodyPr wrap="square" rtlCol="0">
+            <a:spAutoFit/>
+          </a:bodyPr>
+          <a:lstStyle/>
+          <a:p>
+            <a:r>
+              <a:rPr lang="en-US" dirty="0" smtClean="0"/>
+              <a:t>CREATE TABLE Task(PID INTEGER NOT NULL PRIMARY KEY AUTOINCREMENT, </a:t>
+            </a:r>
+            <a:r>
+              <a:rPr lang="en-US" dirty="0" err="1" smtClean="0"/>
+              <a:t>ProjectName</a:t>
+            </a:r>
+            <a:r>
+              <a:rPr lang="en-US" dirty="0" smtClean="0"/>
+              <a:t> VARCHAR(50) NOT NULL, </a:t>
+            </a:r>
+            <a:r>
+              <a:rPr lang="en-US" dirty="0" err="1" smtClean="0"/>
+              <a:t>StartDate</a:t>
+            </a:r>
+            <a:r>
+              <a:rPr lang="en-US" dirty="0" smtClean="0"/>
+              <a:t> DATE, </a:t>
+            </a:r>
+            <a:r>
+              <a:rPr lang="en-US" dirty="0" err="1" smtClean="0"/>
+              <a:t>DeadLine</a:t>
+            </a:r>
+            <a:r>
+              <a:rPr lang="en-US" dirty="0" smtClean="0"/>
+              <a:t> Date, Budget INT, </a:t>
+            </a:r>
+            <a:r>
+              <a:rPr lang="en-US" dirty="0"/>
+              <a:t>Done BOOLEAN</a:t>
+            </a:r>
+            <a:r>
+              <a:rPr lang="en-US" dirty="0" smtClean="0"/>
+              <a:t>);</a:t>
+            </a:r>
+            <a:endParaRPr lang="en-US" dirty="0"/>
+          </a:p>
+        </p:txBody>
+      </p:sp>
+      <p:sp>
+        <p:nvSpPr>
+          <p:cNvPr id="6" name="TextBox 5"/>
+          <p:cNvSpPr txBox="1"/>
+          <p:nvPr/>
+        </p:nvSpPr>
+        <p:spPr>
+          <a:xfrm>
+            <a:off x="757282" y="3789040"/>
+            <a:ext cx="7704856" cy="923330"/>
+          </a:xfrm>
+          <a:prstGeom prst="rect">
+            <a:avLst/>
+          </a:prstGeom>
+          <a:noFill/>
+        </p:spPr>
+        <p:txBody>
+          <a:bodyPr wrap="square" rtlCol="0">
+            <a:spAutoFit/>
+          </a:bodyPr>
+          <a:lstStyle/>
+          <a:p>
+            <a:r>
+              <a:rPr lang="en-US" dirty="0" smtClean="0"/>
+              <a:t>CREATE TABLE Resource(RID INTEGER NOT NULL PRIMARY KEY AUTOINCREMENT, </a:t>
+            </a:r>
+            <a:r>
+              <a:rPr lang="en-US" dirty="0" err="1" smtClean="0"/>
+              <a:t>FirstName</a:t>
+            </a:r>
+            <a:r>
+              <a:rPr lang="en-US" dirty="0"/>
+              <a:t> </a:t>
+            </a:r>
+            <a:r>
+              <a:rPr lang="en-US" dirty="0" smtClean="0"/>
+              <a:t>VARCHAR(50), </a:t>
+            </a:r>
+            <a:r>
+              <a:rPr lang="en-US" dirty="0" err="1" smtClean="0"/>
+              <a:t>LastName</a:t>
+            </a:r>
+            <a:r>
+              <a:rPr lang="en-US" dirty="0" smtClean="0"/>
+              <a:t> VARCHAR(50), Salary INT,  </a:t>
+            </a:r>
+            <a:r>
+              <a:rPr lang="en-US" dirty="0" err="1" smtClean="0"/>
+              <a:t>UserName</a:t>
+            </a:r>
+            <a:r>
+              <a:rPr lang="en-US" dirty="0" smtClean="0"/>
+              <a:t> VARCHAR(10), Password char(32), Manager BOOLEAN);</a:t>
+            </a:r>
+            <a:endParaRPr lang="en-US" dirty="0"/>
+          </a:p>
+        </p:txBody>
+      </p:sp>
+      <p:sp>
+        <p:nvSpPr>
+          <p:cNvPr id="7" name="TextBox 6"/>
+          <p:cNvSpPr txBox="1"/>
+          <p:nvPr/>
+        </p:nvSpPr>
+        <p:spPr>
+          <a:xfrm>
+            <a:off x="909682" y="5013176"/>
+            <a:ext cx="7704856" cy="646331"/>
+          </a:xfrm>
+          <a:prstGeom prst="rect">
+            <a:avLst/>
+          </a:prstGeom>
+          <a:noFill/>
+        </p:spPr>
+        <p:txBody>
+          <a:bodyPr wrap="square" rtlCol="0">
+            <a:spAutoFit/>
+          </a:bodyPr>
+          <a:lstStyle/>
+          <a:p>
+            <a:r>
+              <a:rPr lang="en-US" dirty="0" smtClean="0"/>
+              <a:t>CREATE TABLE </a:t>
+            </a:r>
+            <a:r>
+              <a:rPr lang="en-US" dirty="0" err="1" smtClean="0"/>
+              <a:t>AssignedTask</a:t>
+            </a:r>
+            <a:r>
+              <a:rPr lang="en-US" dirty="0" smtClean="0"/>
+              <a:t>(RID INT NOT NULL, TID INT </a:t>
+            </a:r>
+            <a:r>
+              <a:rPr lang="en-US" dirty="0"/>
+              <a:t>NOT NULL, </a:t>
+            </a:r>
+            <a:r>
+              <a:rPr lang="en-US" dirty="0" smtClean="0"/>
+              <a:t>Description TEXT, Deadline DATE, </a:t>
+            </a:r>
+            <a:r>
+              <a:rPr lang="en-US" dirty="0" err="1" smtClean="0"/>
+              <a:t>RequiredHoursWork</a:t>
+            </a:r>
+            <a:r>
+              <a:rPr lang="en-US" dirty="0" smtClean="0"/>
+              <a:t> INT, Done BOOLEAN);</a:t>
+            </a:r>
+            <a:endParaRPr lang="en-US" dirty="0"/>
+          </a:p>
+        </p:txBody>
+      </p:sp>
+    </p:spTree>
+    <p:extLst>
+      <p:ext uri="{BB962C8B-B14F-4D97-AF65-F5344CB8AC3E}">
+        <p14:creationId xmlns:p14="http://schemas.microsoft.com/office/powerpoint/2010/main" val="3069955782"/>
       </p:ext>
     </p:extLst>
   </p:cSld>

</xml_diff>

<commit_message>
Update, Delete, Create, Last inserted Id functions are added. Database is updated.
</commit_message>
<xml_diff>
--- a/Documents/Database_ER_Diagram.pptx
+++ b/Documents/Database_ER_Diagram.pptx
@@ -290,7 +290,7 @@
           <a:p>
             <a:fld id="{F6A7B8BE-4DB8-4656-B6E2-5E4196D6FD27}" type="datetimeFigureOut">
               <a:rPr lang="en-US" smtClean="0"/>
-              <a:t>5/12/2016</a:t>
+              <a:t>5/18/2016</a:t>
             </a:fld>
             <a:endParaRPr lang="en-US"/>
           </a:p>
@@ -460,7 +460,7 @@
           <a:p>
             <a:fld id="{F6A7B8BE-4DB8-4656-B6E2-5E4196D6FD27}" type="datetimeFigureOut">
               <a:rPr lang="en-US" smtClean="0"/>
-              <a:t>5/12/2016</a:t>
+              <a:t>5/18/2016</a:t>
             </a:fld>
             <a:endParaRPr lang="en-US"/>
           </a:p>
@@ -640,7 +640,7 @@
           <a:p>
             <a:fld id="{F6A7B8BE-4DB8-4656-B6E2-5E4196D6FD27}" type="datetimeFigureOut">
               <a:rPr lang="en-US" smtClean="0"/>
-              <a:t>5/12/2016</a:t>
+              <a:t>5/18/2016</a:t>
             </a:fld>
             <a:endParaRPr lang="en-US"/>
           </a:p>
@@ -810,7 +810,7 @@
           <a:p>
             <a:fld id="{F6A7B8BE-4DB8-4656-B6E2-5E4196D6FD27}" type="datetimeFigureOut">
               <a:rPr lang="en-US" smtClean="0"/>
-              <a:t>5/12/2016</a:t>
+              <a:t>5/18/2016</a:t>
             </a:fld>
             <a:endParaRPr lang="en-US"/>
           </a:p>
@@ -1056,7 +1056,7 @@
           <a:p>
             <a:fld id="{F6A7B8BE-4DB8-4656-B6E2-5E4196D6FD27}" type="datetimeFigureOut">
               <a:rPr lang="en-US" smtClean="0"/>
-              <a:t>5/12/2016</a:t>
+              <a:t>5/18/2016</a:t>
             </a:fld>
             <a:endParaRPr lang="en-US"/>
           </a:p>
@@ -1344,7 +1344,7 @@
           <a:p>
             <a:fld id="{F6A7B8BE-4DB8-4656-B6E2-5E4196D6FD27}" type="datetimeFigureOut">
               <a:rPr lang="en-US" smtClean="0"/>
-              <a:t>5/12/2016</a:t>
+              <a:t>5/18/2016</a:t>
             </a:fld>
             <a:endParaRPr lang="en-US"/>
           </a:p>
@@ -1766,7 +1766,7 @@
           <a:p>
             <a:fld id="{F6A7B8BE-4DB8-4656-B6E2-5E4196D6FD27}" type="datetimeFigureOut">
               <a:rPr lang="en-US" smtClean="0"/>
-              <a:t>5/12/2016</a:t>
+              <a:t>5/18/2016</a:t>
             </a:fld>
             <a:endParaRPr lang="en-US"/>
           </a:p>
@@ -1884,7 +1884,7 @@
           <a:p>
             <a:fld id="{F6A7B8BE-4DB8-4656-B6E2-5E4196D6FD27}" type="datetimeFigureOut">
               <a:rPr lang="en-US" smtClean="0"/>
-              <a:t>5/12/2016</a:t>
+              <a:t>5/18/2016</a:t>
             </a:fld>
             <a:endParaRPr lang="en-US"/>
           </a:p>
@@ -1979,7 +1979,7 @@
           <a:p>
             <a:fld id="{F6A7B8BE-4DB8-4656-B6E2-5E4196D6FD27}" type="datetimeFigureOut">
               <a:rPr lang="en-US" smtClean="0"/>
-              <a:t>5/12/2016</a:t>
+              <a:t>5/18/2016</a:t>
             </a:fld>
             <a:endParaRPr lang="en-US"/>
           </a:p>
@@ -2256,7 +2256,7 @@
           <a:p>
             <a:fld id="{F6A7B8BE-4DB8-4656-B6E2-5E4196D6FD27}" type="datetimeFigureOut">
               <a:rPr lang="en-US" smtClean="0"/>
-              <a:t>5/12/2016</a:t>
+              <a:t>5/18/2016</a:t>
             </a:fld>
             <a:endParaRPr lang="en-US"/>
           </a:p>
@@ -2509,7 +2509,7 @@
           <a:p>
             <a:fld id="{F6A7B8BE-4DB8-4656-B6E2-5E4196D6FD27}" type="datetimeFigureOut">
               <a:rPr lang="en-US" smtClean="0"/>
-              <a:t>5/12/2016</a:t>
+              <a:t>5/18/2016</a:t>
             </a:fld>
             <a:endParaRPr lang="en-US"/>
           </a:p>
@@ -2722,7 +2722,7 @@
           <a:p>
             <a:fld id="{F6A7B8BE-4DB8-4656-B6E2-5E4196D6FD27}" type="datetimeFigureOut">
               <a:rPr lang="en-US" smtClean="0"/>
-              <a:t>5/12/2016</a:t>
+              <a:t>5/18/2016</a:t>
             </a:fld>
             <a:endParaRPr lang="en-US"/>
           </a:p>
@@ -5447,6 +5447,119 @@
           </a:p>
         </p:txBody>
       </p:sp>
+      <p:sp>
+        <p:nvSpPr>
+          <p:cNvPr id="58" name="Rectangle 57"/>
+          <p:cNvSpPr/>
+          <p:nvPr/>
+        </p:nvSpPr>
+        <p:spPr>
+          <a:xfrm>
+            <a:off x="2908796" y="2890903"/>
+            <a:ext cx="891392" cy="212098"/>
+          </a:xfrm>
+          <a:prstGeom prst="rect">
+            <a:avLst/>
+          </a:prstGeom>
+          <a:noFill/>
+          <a:ln>
+            <a:solidFill>
+              <a:schemeClr val="tx1"/>
+            </a:solidFill>
+          </a:ln>
+        </p:spPr>
+        <p:style>
+          <a:lnRef idx="2">
+            <a:schemeClr val="accent1">
+              <a:shade val="50000"/>
+            </a:schemeClr>
+          </a:lnRef>
+          <a:fillRef idx="1">
+            <a:schemeClr val="accent1"/>
+          </a:fillRef>
+          <a:effectRef idx="0">
+            <a:schemeClr val="accent1"/>
+          </a:effectRef>
+          <a:fontRef idx="minor">
+            <a:schemeClr val="lt1"/>
+          </a:fontRef>
+        </p:style>
+        <p:txBody>
+          <a:bodyPr lIns="0" tIns="0" rIns="0" bIns="0" rtlCol="0" anchor="ctr"/>
+          <a:lstStyle/>
+          <a:p>
+            <a:pPr algn="ctr"/>
+            <a:r>
+              <a:rPr lang="en-US" sz="1200" dirty="0" smtClean="0">
+                <a:solidFill>
+                  <a:schemeClr val="tx1"/>
+                </a:solidFill>
+              </a:rPr>
+              <a:t>task</a:t>
+            </a:r>
+            <a:endParaRPr lang="en-US" sz="1200" dirty="0">
+              <a:solidFill>
+                <a:schemeClr val="tx1"/>
+              </a:solidFill>
+            </a:endParaRPr>
+          </a:p>
+        </p:txBody>
+      </p:sp>
+      <p:sp>
+        <p:nvSpPr>
+          <p:cNvPr id="63" name="Diamond 62"/>
+          <p:cNvSpPr/>
+          <p:nvPr/>
+        </p:nvSpPr>
+        <p:spPr>
+          <a:xfrm>
+            <a:off x="3158389" y="2069232"/>
+            <a:ext cx="337682" cy="271264"/>
+          </a:xfrm>
+          <a:prstGeom prst="diamond">
+            <a:avLst/>
+          </a:prstGeom>
+          <a:noFill/>
+          <a:ln>
+            <a:solidFill>
+              <a:schemeClr val="tx1"/>
+            </a:solidFill>
+          </a:ln>
+        </p:spPr>
+        <p:style>
+          <a:lnRef idx="2">
+            <a:schemeClr val="accent1">
+              <a:shade val="50000"/>
+            </a:schemeClr>
+          </a:lnRef>
+          <a:fillRef idx="1">
+            <a:schemeClr val="accent1"/>
+          </a:fillRef>
+          <a:effectRef idx="0">
+            <a:schemeClr val="accent1"/>
+          </a:effectRef>
+          <a:fontRef idx="minor">
+            <a:schemeClr val="lt1"/>
+          </a:fontRef>
+        </p:style>
+        <p:txBody>
+          <a:bodyPr rot="0" spcFirstLastPara="0" vertOverflow="overflow" horzOverflow="overflow" vert="horz" wrap="square" lIns="0" tIns="0" rIns="0" bIns="0" numCol="1" spcCol="0" rtlCol="0" fromWordArt="0" anchor="ctr" anchorCtr="0" forceAA="0" compatLnSpc="1">
+            <a:prstTxWarp prst="textNoShape">
+              <a:avLst/>
+            </a:prstTxWarp>
+            <a:noAutofit/>
+          </a:bodyPr>
+          <a:lstStyle/>
+          <a:p>
+            <a:pPr algn="ctr"/>
+            <a:endParaRPr lang="en-US" sz="1200">
+              <a:solidFill>
+                <a:schemeClr val="tx1"/>
+              </a:solidFill>
+            </a:endParaRPr>
+          </a:p>
+        </p:txBody>
+      </p:sp>
     </p:spTree>
     <p:extLst>
       <p:ext uri="{BB962C8B-B14F-4D97-AF65-F5344CB8AC3E}">
@@ -5790,7 +5903,7 @@
         </p:nvSpPr>
         <p:spPr>
           <a:xfrm>
-            <a:off x="757282" y="3789040"/>
+            <a:off x="757282" y="3645024"/>
             <a:ext cx="7704856" cy="923330"/>
           </a:xfrm>
           <a:prstGeom prst="rect">
@@ -5848,7 +5961,7 @@
         </p:nvSpPr>
         <p:spPr>
           <a:xfrm>
-            <a:off x="909682" y="5013176"/>
+            <a:off x="757282" y="4719222"/>
             <a:ext cx="7704856" cy="646331"/>
           </a:xfrm>
           <a:prstGeom prst="rect">
@@ -5889,6 +6002,60 @@
             <a:r>
               <a:rPr lang="en-US" dirty="0" smtClean="0"/>
               <a:t> INT, Done BOOLEAN);</a:t>
+            </a:r>
+            <a:endParaRPr lang="en-US" dirty="0"/>
+          </a:p>
+        </p:txBody>
+      </p:sp>
+      <p:sp>
+        <p:nvSpPr>
+          <p:cNvPr id="8" name="TextBox 7"/>
+          <p:cNvSpPr txBox="1"/>
+          <p:nvPr/>
+        </p:nvSpPr>
+        <p:spPr>
+          <a:xfrm>
+            <a:off x="909682" y="5661248"/>
+            <a:ext cx="7704856" cy="646331"/>
+          </a:xfrm>
+          <a:prstGeom prst="rect">
+            <a:avLst/>
+          </a:prstGeom>
+          <a:noFill/>
+        </p:spPr>
+        <p:txBody>
+          <a:bodyPr wrap="square" rtlCol="0">
+            <a:spAutoFit/>
+          </a:bodyPr>
+          <a:lstStyle/>
+          <a:p>
+            <a:r>
+              <a:rPr lang="en-US" dirty="0" smtClean="0"/>
+              <a:t>CREATE TABLE </a:t>
+            </a:r>
+            <a:r>
+              <a:rPr lang="en-US" dirty="0" err="1" smtClean="0"/>
+              <a:t>TaskDependancy</a:t>
+            </a:r>
+            <a:r>
+              <a:rPr lang="en-US" dirty="0" smtClean="0"/>
+              <a:t>(</a:t>
+            </a:r>
+            <a:r>
+              <a:rPr lang="en-US" dirty="0" err="1" smtClean="0"/>
+              <a:t>TIDMain</a:t>
+            </a:r>
+            <a:r>
+              <a:rPr lang="en-US" dirty="0" smtClean="0"/>
+              <a:t> INT NOT NULL, </a:t>
+            </a:r>
+            <a:r>
+              <a:rPr lang="en-US" dirty="0" err="1" smtClean="0"/>
+              <a:t>TIDDependent</a:t>
+            </a:r>
+            <a:r>
+              <a:rPr lang="en-US" dirty="0" smtClean="0"/>
+              <a:t> INT NOT NULL);</a:t>
             </a:r>
             <a:endParaRPr lang="en-US" dirty="0"/>
           </a:p>

</xml_diff>